<commit_message>
Updated derivatives with proper partial derivative letter
</commit_message>
<xml_diff>
--- a/assets/GradientDescent/Gradient Descent.pptx
+++ b/assets/GradientDescent/Gradient Descent.pptx
@@ -250,7 +250,7 @@
           <a:p>
             <a:fld id="{E0864C03-AC65-44BE-9378-B92BCFE6E46F}" type="datetimeFigureOut">
               <a:rPr lang="en-US" smtClean="0"/>
-              <a:t>3/27/2017</a:t>
+              <a:t>3/29/2019</a:t>
             </a:fld>
             <a:endParaRPr lang="en-US"/>
           </a:p>
@@ -420,7 +420,7 @@
           <a:p>
             <a:fld id="{E0864C03-AC65-44BE-9378-B92BCFE6E46F}" type="datetimeFigureOut">
               <a:rPr lang="en-US" smtClean="0"/>
-              <a:t>3/27/2017</a:t>
+              <a:t>3/29/2019</a:t>
             </a:fld>
             <a:endParaRPr lang="en-US"/>
           </a:p>
@@ -600,7 +600,7 @@
           <a:p>
             <a:fld id="{E0864C03-AC65-44BE-9378-B92BCFE6E46F}" type="datetimeFigureOut">
               <a:rPr lang="en-US" smtClean="0"/>
-              <a:t>3/27/2017</a:t>
+              <a:t>3/29/2019</a:t>
             </a:fld>
             <a:endParaRPr lang="en-US"/>
           </a:p>
@@ -770,7 +770,7 @@
           <a:p>
             <a:fld id="{E0864C03-AC65-44BE-9378-B92BCFE6E46F}" type="datetimeFigureOut">
               <a:rPr lang="en-US" smtClean="0"/>
-              <a:t>3/27/2017</a:t>
+              <a:t>3/29/2019</a:t>
             </a:fld>
             <a:endParaRPr lang="en-US"/>
           </a:p>
@@ -1016,7 +1016,7 @@
           <a:p>
             <a:fld id="{E0864C03-AC65-44BE-9378-B92BCFE6E46F}" type="datetimeFigureOut">
               <a:rPr lang="en-US" smtClean="0"/>
-              <a:t>3/27/2017</a:t>
+              <a:t>3/29/2019</a:t>
             </a:fld>
             <a:endParaRPr lang="en-US"/>
           </a:p>
@@ -1248,7 +1248,7 @@
           <a:p>
             <a:fld id="{E0864C03-AC65-44BE-9378-B92BCFE6E46F}" type="datetimeFigureOut">
               <a:rPr lang="en-US" smtClean="0"/>
-              <a:t>3/27/2017</a:t>
+              <a:t>3/29/2019</a:t>
             </a:fld>
             <a:endParaRPr lang="en-US"/>
           </a:p>
@@ -1615,7 +1615,7 @@
           <a:p>
             <a:fld id="{E0864C03-AC65-44BE-9378-B92BCFE6E46F}" type="datetimeFigureOut">
               <a:rPr lang="en-US" smtClean="0"/>
-              <a:t>3/27/2017</a:t>
+              <a:t>3/29/2019</a:t>
             </a:fld>
             <a:endParaRPr lang="en-US"/>
           </a:p>
@@ -1733,7 +1733,7 @@
           <a:p>
             <a:fld id="{E0864C03-AC65-44BE-9378-B92BCFE6E46F}" type="datetimeFigureOut">
               <a:rPr lang="en-US" smtClean="0"/>
-              <a:t>3/27/2017</a:t>
+              <a:t>3/29/2019</a:t>
             </a:fld>
             <a:endParaRPr lang="en-US"/>
           </a:p>
@@ -1828,7 +1828,7 @@
           <a:p>
             <a:fld id="{E0864C03-AC65-44BE-9378-B92BCFE6E46F}" type="datetimeFigureOut">
               <a:rPr lang="en-US" smtClean="0"/>
-              <a:t>3/27/2017</a:t>
+              <a:t>3/29/2019</a:t>
             </a:fld>
             <a:endParaRPr lang="en-US"/>
           </a:p>
@@ -2105,7 +2105,7 @@
           <a:p>
             <a:fld id="{E0864C03-AC65-44BE-9378-B92BCFE6E46F}" type="datetimeFigureOut">
               <a:rPr lang="en-US" smtClean="0"/>
-              <a:t>3/27/2017</a:t>
+              <a:t>3/29/2019</a:t>
             </a:fld>
             <a:endParaRPr lang="en-US"/>
           </a:p>
@@ -2358,7 +2358,7 @@
           <a:p>
             <a:fld id="{E0864C03-AC65-44BE-9378-B92BCFE6E46F}" type="datetimeFigureOut">
               <a:rPr lang="en-US" smtClean="0"/>
-              <a:t>3/27/2017</a:t>
+              <a:t>3/29/2019</a:t>
             </a:fld>
             <a:endParaRPr lang="en-US"/>
           </a:p>
@@ -2571,7 +2571,7 @@
           <a:p>
             <a:fld id="{E0864C03-AC65-44BE-9378-B92BCFE6E46F}" type="datetimeFigureOut">
               <a:rPr lang="en-US" smtClean="0"/>
-              <a:t>3/27/2017</a:t>
+              <a:t>3/29/2019</a:t>
             </a:fld>
             <a:endParaRPr lang="en-US"/>
           </a:p>
@@ -6344,8 +6344,8 @@
           </p:sp>
         </mc:Fallback>
       </mc:AlternateContent>
-      <mc:AlternateContent xmlns:mc="http://schemas.openxmlformats.org/markup-compatibility/2006">
-        <mc:Choice xmlns:a14="http://schemas.microsoft.com/office/drawing/2010/main" Requires="a14">
+      <mc:AlternateContent xmlns:mc="http://schemas.openxmlformats.org/markup-compatibility/2006" xmlns:a14="http://schemas.microsoft.com/office/drawing/2010/main">
+        <mc:Choice Requires="a14">
           <p:sp>
             <p:nvSpPr>
               <p:cNvPr id="9" name="Rectangle 8"/>
@@ -6369,11 +6369,7 @@
               <a:p>
                 <a:r>
                   <a:rPr lang="en-US" sz="1200" dirty="0" smtClean="0"/>
-                  <a:t>Chain </a:t>
-                </a:r>
-                <a:r>
-                  <a:rPr lang="en-US" sz="1200" dirty="0" smtClean="0"/>
-                  <a:t>rule:		</a:t>
+                  <a:t>Chain rule:		</a:t>
                 </a:r>
                 <a14:m>
                   <m:oMath xmlns:m="http://schemas.openxmlformats.org/officeDocument/2006/math">
@@ -6441,13 +6437,7 @@
                       <a:rPr lang="en-US" sz="1200" b="0" i="1" smtClean="0">
                         <a:latin typeface="Cambria Math" panose="02040503050406030204" pitchFamily="18" charset="0"/>
                       </a:rPr>
-                      <m:t>)</m:t>
-                    </m:r>
-                    <m:r>
-                      <a:rPr lang="en-US" sz="1200" b="0" i="1" smtClean="0">
-                        <a:latin typeface="Cambria Math" panose="02040503050406030204" pitchFamily="18" charset="0"/>
-                      </a:rPr>
-                      <m:t>=</m:t>
+                      <m:t>)=</m:t>
                     </m:r>
                     <m:sSup>
                       <m:sSupPr>
@@ -6539,7 +6529,7 @@
             </p:txBody>
           </p:sp>
         </mc:Choice>
-        <mc:Fallback>
+        <mc:Fallback xmlns="">
           <p:sp>
             <p:nvSpPr>
               <p:cNvPr id="9" name="Rectangle 8"/>
@@ -6645,8 +6635,8 @@
             <a:chExt cx="5020049" cy="3536224"/>
           </a:xfrm>
         </p:grpSpPr>
-        <mc:AlternateContent xmlns:mc="http://schemas.openxmlformats.org/markup-compatibility/2006" xmlns:a14="http://schemas.microsoft.com/office/drawing/2010/main">
-          <mc:Choice Requires="a14">
+        <mc:AlternateContent xmlns:mc="http://schemas.openxmlformats.org/markup-compatibility/2006">
+          <mc:Choice xmlns:a14="http://schemas.microsoft.com/office/drawing/2010/main" Requires="a14">
             <p:sp>
               <p:nvSpPr>
                 <p:cNvPr id="4" name="Rectangle 3"/>
@@ -6939,16 +6929,16 @@
                                 <a:latin typeface="Cambria Math" panose="02040503050406030204" pitchFamily="18" charset="0"/>
                                 <a:ea typeface="Cambria Math" panose="02040503050406030204" pitchFamily="18" charset="0"/>
                               </a:rPr>
-                              <m:t>𝑑</m:t>
+                              <m:t>𝜕</m:t>
                             </m:r>
                           </m:num>
                           <m:den>
                             <m:r>
-                              <a:rPr lang="en-US" sz="1200" b="0" i="1" smtClean="0">
+                              <a:rPr lang="en-US" sz="1200" i="1">
                                 <a:latin typeface="Cambria Math" panose="02040503050406030204" pitchFamily="18" charset="0"/>
                                 <a:ea typeface="Cambria Math" panose="02040503050406030204" pitchFamily="18" charset="0"/>
                               </a:rPr>
-                              <m:t>𝑑</m:t>
+                              <m:t>𝜕</m:t>
                             </m:r>
                             <m:sSub>
                               <m:sSubPr>
@@ -7087,20 +7077,20 @@
                           </m:fPr>
                           <m:num>
                             <m:r>
-                              <a:rPr lang="en-US" sz="1200" b="0" i="1" smtClean="0">
+                              <a:rPr lang="en-US" sz="1200" i="1">
                                 <a:latin typeface="Cambria Math" panose="02040503050406030204" pitchFamily="18" charset="0"/>
                                 <a:ea typeface="Cambria Math" panose="02040503050406030204" pitchFamily="18" charset="0"/>
                               </a:rPr>
-                              <m:t>𝑑</m:t>
+                              <m:t>𝜕</m:t>
                             </m:r>
                           </m:num>
                           <m:den>
                             <m:r>
-                              <a:rPr lang="en-US" sz="1200" b="0" i="1" smtClean="0">
+                              <a:rPr lang="en-US" sz="1200" i="1">
                                 <a:latin typeface="Cambria Math" panose="02040503050406030204" pitchFamily="18" charset="0"/>
                                 <a:ea typeface="Cambria Math" panose="02040503050406030204" pitchFamily="18" charset="0"/>
                               </a:rPr>
-                              <m:t>𝑑</m:t>
+                              <m:t>𝜕</m:t>
                             </m:r>
                             <m:sSub>
                               <m:sSubPr>
@@ -7633,20 +7623,20 @@
                               </m:fPr>
                               <m:num>
                                 <m:r>
-                                  <a:rPr lang="en-US" sz="1200" b="0" i="1" smtClean="0">
+                                  <a:rPr lang="en-US" sz="1200" i="1">
                                     <a:latin typeface="Cambria Math" panose="02040503050406030204" pitchFamily="18" charset="0"/>
                                     <a:ea typeface="Cambria Math" panose="02040503050406030204" pitchFamily="18" charset="0"/>
                                   </a:rPr>
-                                  <m:t>𝑑</m:t>
+                                  <m:t>𝜕</m:t>
                                 </m:r>
                               </m:num>
                               <m:den>
                                 <m:r>
-                                  <a:rPr lang="en-US" sz="1200" b="0" i="1" smtClean="0">
+                                  <a:rPr lang="en-US" sz="1200" i="1">
                                     <a:latin typeface="Cambria Math" panose="02040503050406030204" pitchFamily="18" charset="0"/>
                                     <a:ea typeface="Cambria Math" panose="02040503050406030204" pitchFamily="18" charset="0"/>
                                   </a:rPr>
-                                  <m:t>𝑑</m:t>
+                                  <m:t>𝜕</m:t>
                                 </m:r>
                                 <m:sSub>
                                   <m:sSubPr>
@@ -8240,20 +8230,20 @@
                               </m:fPr>
                               <m:num>
                                 <m:r>
-                                  <a:rPr lang="en-US" sz="1200" b="0" i="1" smtClean="0">
+                                  <a:rPr lang="en-US" sz="1200" i="1">
                                     <a:latin typeface="Cambria Math" panose="02040503050406030204" pitchFamily="18" charset="0"/>
                                     <a:ea typeface="Cambria Math" panose="02040503050406030204" pitchFamily="18" charset="0"/>
                                   </a:rPr>
-                                  <m:t>𝑑</m:t>
+                                  <m:t>𝜕</m:t>
                                 </m:r>
                               </m:num>
                               <m:den>
                                 <m:r>
-                                  <a:rPr lang="en-US" sz="1200" b="0" i="1" smtClean="0">
+                                  <a:rPr lang="en-US" sz="1200" i="1">
                                     <a:latin typeface="Cambria Math" panose="02040503050406030204" pitchFamily="18" charset="0"/>
                                     <a:ea typeface="Cambria Math" panose="02040503050406030204" pitchFamily="18" charset="0"/>
                                   </a:rPr>
-                                  <m:t>𝑑</m:t>
+                                  <m:t>𝜕</m:t>
                                 </m:r>
                                 <m:sSub>
                                   <m:sSubPr>
@@ -8824,7 +8814,7 @@
               </p:txBody>
             </p:sp>
           </mc:Choice>
-          <mc:Fallback xmlns="">
+          <mc:Fallback>
             <p:sp>
               <p:nvSpPr>
                 <p:cNvPr id="4" name="Rectangle 3"/>
@@ -9012,8 +9002,8 @@
           </p:txBody>
         </p:sp>
       </p:grpSp>
-      <mc:AlternateContent xmlns:mc="http://schemas.openxmlformats.org/markup-compatibility/2006" xmlns:a14="http://schemas.microsoft.com/office/drawing/2010/main">
-        <mc:Choice Requires="a14">
+      <mc:AlternateContent xmlns:mc="http://schemas.openxmlformats.org/markup-compatibility/2006">
+        <mc:Choice xmlns:a14="http://schemas.microsoft.com/office/drawing/2010/main" Requires="a14">
           <p:sp>
             <p:nvSpPr>
               <p:cNvPr id="8" name="Rectangle 7"/>
@@ -9023,7 +9013,7 @@
             <p:spPr>
               <a:xfrm>
                 <a:off x="6671053" y="4350260"/>
-                <a:ext cx="3660041" cy="474297"/>
+                <a:ext cx="3630801" cy="486543"/>
               </a:xfrm>
               <a:prstGeom prst="rect">
                 <a:avLst/>
@@ -9053,20 +9043,20 @@
                         </m:fPr>
                         <m:num>
                           <m:r>
-                            <a:rPr lang="en-US" sz="1200" b="0" i="1" smtClean="0">
+                            <a:rPr lang="en-US" sz="1200" i="1">
                               <a:latin typeface="Cambria Math" panose="02040503050406030204" pitchFamily="18" charset="0"/>
                               <a:ea typeface="Cambria Math" panose="02040503050406030204" pitchFamily="18" charset="0"/>
                             </a:rPr>
-                            <m:t>𝑑</m:t>
+                            <m:t>𝜕</m:t>
                           </m:r>
                         </m:num>
                         <m:den>
                           <m:r>
-                            <a:rPr lang="en-US" sz="1200" b="0" i="1" smtClean="0">
+                            <a:rPr lang="en-US" sz="1200" i="1">
                               <a:latin typeface="Cambria Math" panose="02040503050406030204" pitchFamily="18" charset="0"/>
                               <a:ea typeface="Cambria Math" panose="02040503050406030204" pitchFamily="18" charset="0"/>
                             </a:rPr>
-                            <m:t>𝑑</m:t>
+                            <m:t>𝜕</m:t>
                           </m:r>
                           <m:sSub>
                             <m:sSubPr>
@@ -9240,20 +9230,20 @@
                         </m:fPr>
                         <m:num>
                           <m:r>
-                            <a:rPr lang="en-US" sz="1200" b="0" i="1" smtClean="0">
+                            <a:rPr lang="en-US" sz="1200" i="1">
                               <a:latin typeface="Cambria Math" panose="02040503050406030204" pitchFamily="18" charset="0"/>
                               <a:ea typeface="Cambria Math" panose="02040503050406030204" pitchFamily="18" charset="0"/>
                             </a:rPr>
-                            <m:t>𝑑</m:t>
+                            <m:t>𝜕</m:t>
                           </m:r>
                         </m:num>
                         <m:den>
                           <m:r>
-                            <a:rPr lang="en-US" sz="1200" b="0" i="1" smtClean="0">
+                            <a:rPr lang="en-US" sz="1200" i="1">
                               <a:latin typeface="Cambria Math" panose="02040503050406030204" pitchFamily="18" charset="0"/>
                               <a:ea typeface="Cambria Math" panose="02040503050406030204" pitchFamily="18" charset="0"/>
                             </a:rPr>
-                            <m:t>𝑑</m:t>
+                            <m:t>𝜕</m:t>
                           </m:r>
                           <m:sSub>
                             <m:sSubPr>
@@ -9447,7 +9437,7 @@
             </p:txBody>
           </p:sp>
         </mc:Choice>
-        <mc:Fallback xmlns="">
+        <mc:Fallback>
           <p:sp>
             <p:nvSpPr>
               <p:cNvPr id="8" name="Rectangle 7"/>
@@ -9459,7 +9449,7 @@
             <p:spPr>
               <a:xfrm>
                 <a:off x="6671053" y="4350260"/>
-                <a:ext cx="3660041" cy="474297"/>
+                <a:ext cx="3630801" cy="486543"/>
               </a:xfrm>
               <a:prstGeom prst="rect">
                 <a:avLst/>
@@ -9486,8 +9476,8 @@
           </p:sp>
         </mc:Fallback>
       </mc:AlternateContent>
-      <mc:AlternateContent xmlns:mc="http://schemas.openxmlformats.org/markup-compatibility/2006" xmlns:a14="http://schemas.microsoft.com/office/drawing/2010/main">
-        <mc:Choice Requires="a14">
+      <mc:AlternateContent xmlns:mc="http://schemas.openxmlformats.org/markup-compatibility/2006">
+        <mc:Choice xmlns:a14="http://schemas.microsoft.com/office/drawing/2010/main" Requires="a14">
           <p:sp>
             <p:nvSpPr>
               <p:cNvPr id="9" name="Rectangle 8"/>
@@ -9497,7 +9487,7 @@
             <p:spPr>
               <a:xfrm>
                 <a:off x="6671053" y="5015570"/>
-                <a:ext cx="3654334" cy="473143"/>
+                <a:ext cx="3625095" cy="485389"/>
               </a:xfrm>
               <a:prstGeom prst="rect">
                 <a:avLst/>
@@ -9527,20 +9517,20 @@
                         </m:fPr>
                         <m:num>
                           <m:r>
-                            <a:rPr lang="en-US" sz="1200" b="0" i="1" smtClean="0">
+                            <a:rPr lang="en-US" sz="1200" i="1">
                               <a:latin typeface="Cambria Math" panose="02040503050406030204" pitchFamily="18" charset="0"/>
                               <a:ea typeface="Cambria Math" panose="02040503050406030204" pitchFamily="18" charset="0"/>
                             </a:rPr>
-                            <m:t>𝑑</m:t>
+                            <m:t>𝜕</m:t>
                           </m:r>
                         </m:num>
                         <m:den>
                           <m:r>
-                            <a:rPr lang="en-US" sz="1200" b="0" i="1" smtClean="0">
+                            <a:rPr lang="en-US" sz="1200" i="1">
                               <a:latin typeface="Cambria Math" panose="02040503050406030204" pitchFamily="18" charset="0"/>
                               <a:ea typeface="Cambria Math" panose="02040503050406030204" pitchFamily="18" charset="0"/>
                             </a:rPr>
-                            <m:t>𝑑</m:t>
+                            <m:t>𝜕</m:t>
                           </m:r>
                           <m:sSub>
                             <m:sSubPr>
@@ -9714,20 +9704,20 @@
                         </m:fPr>
                         <m:num>
                           <m:r>
-                            <a:rPr lang="en-US" sz="1200" b="0" i="1" smtClean="0">
+                            <a:rPr lang="en-US" sz="1200" i="1">
                               <a:latin typeface="Cambria Math" panose="02040503050406030204" pitchFamily="18" charset="0"/>
                               <a:ea typeface="Cambria Math" panose="02040503050406030204" pitchFamily="18" charset="0"/>
                             </a:rPr>
-                            <m:t>𝑑</m:t>
+                            <m:t>𝜕</m:t>
                           </m:r>
                         </m:num>
                         <m:den>
                           <m:r>
-                            <a:rPr lang="en-US" sz="1200" b="0" i="1" smtClean="0">
+                            <a:rPr lang="en-US" sz="1200" i="1">
                               <a:latin typeface="Cambria Math" panose="02040503050406030204" pitchFamily="18" charset="0"/>
                               <a:ea typeface="Cambria Math" panose="02040503050406030204" pitchFamily="18" charset="0"/>
                             </a:rPr>
-                            <m:t>𝑑</m:t>
+                            <m:t>𝜕</m:t>
                           </m:r>
                           <m:sSub>
                             <m:sSubPr>
@@ -9927,7 +9917,7 @@
             </p:txBody>
           </p:sp>
         </mc:Choice>
-        <mc:Fallback xmlns="">
+        <mc:Fallback>
           <p:sp>
             <p:nvSpPr>
               <p:cNvPr id="9" name="Rectangle 8"/>
@@ -9939,7 +9929,7 @@
             <p:spPr>
               <a:xfrm>
                 <a:off x="6671053" y="5015570"/>
-                <a:ext cx="3654334" cy="473143"/>
+                <a:ext cx="3625095" cy="485389"/>
               </a:xfrm>
               <a:prstGeom prst="rect">
                 <a:avLst/>
@@ -10752,8 +10742,8 @@
           </a:p>
         </p:txBody>
       </p:sp>
-      <mc:AlternateContent xmlns:mc="http://schemas.openxmlformats.org/markup-compatibility/2006" xmlns:a14="http://schemas.microsoft.com/office/drawing/2010/main">
-        <mc:Choice Requires="a14">
+      <mc:AlternateContent xmlns:mc="http://schemas.openxmlformats.org/markup-compatibility/2006">
+        <mc:Choice xmlns:a14="http://schemas.microsoft.com/office/drawing/2010/main" Requires="a14">
           <p:sp>
             <p:nvSpPr>
               <p:cNvPr id="4" name="Rectangle 3"/>
@@ -11430,7 +11420,7 @@
                               <a:latin typeface="Cambria Math" panose="02040503050406030204" pitchFamily="18" charset="0"/>
                               <a:ea typeface="Cambria Math" panose="02040503050406030204" pitchFamily="18" charset="0"/>
                             </a:rPr>
-                            <m:t>𝑑</m:t>
+                            <m:t>𝜕</m:t>
                           </m:r>
                         </m:num>
                         <m:den>
@@ -11439,7 +11429,7 @@
                               <a:latin typeface="Cambria Math" panose="02040503050406030204" pitchFamily="18" charset="0"/>
                               <a:ea typeface="Cambria Math" panose="02040503050406030204" pitchFamily="18" charset="0"/>
                             </a:rPr>
-                            <m:t>𝑑</m:t>
+                            <m:t>𝜕</m:t>
                           </m:r>
                           <m:sSub>
                             <m:sSubPr>
@@ -11667,7 +11657,7 @@
                               <a:latin typeface="Cambria Math" panose="02040503050406030204" pitchFamily="18" charset="0"/>
                               <a:ea typeface="Cambria Math" panose="02040503050406030204" pitchFamily="18" charset="0"/>
                             </a:rPr>
-                            <m:t>𝑑</m:t>
+                            <m:t>𝜕</m:t>
                           </m:r>
                         </m:num>
                         <m:den>
@@ -11676,7 +11666,7 @@
                               <a:latin typeface="Cambria Math" panose="02040503050406030204" pitchFamily="18" charset="0"/>
                               <a:ea typeface="Cambria Math" panose="02040503050406030204" pitchFamily="18" charset="0"/>
                             </a:rPr>
-                            <m:t>𝑑</m:t>
+                            <m:t>𝜕</m:t>
                           </m:r>
                           <m:sSub>
                             <m:sSubPr>
@@ -11822,7 +11812,7 @@
             </p:txBody>
           </p:sp>
         </mc:Choice>
-        <mc:Fallback xmlns="">
+        <mc:Fallback>
           <p:sp>
             <p:nvSpPr>
               <p:cNvPr id="4" name="Rectangle 3"/>
@@ -11861,8 +11851,8 @@
           </p:sp>
         </mc:Fallback>
       </mc:AlternateContent>
-      <mc:AlternateContent xmlns:mc="http://schemas.openxmlformats.org/markup-compatibility/2006" xmlns:a14="http://schemas.microsoft.com/office/drawing/2010/main">
-        <mc:Choice Requires="a14">
+      <mc:AlternateContent xmlns:mc="http://schemas.openxmlformats.org/markup-compatibility/2006">
+        <mc:Choice xmlns:a14="http://schemas.microsoft.com/office/drawing/2010/main" Requires="a14">
           <p:sp>
             <p:nvSpPr>
               <p:cNvPr id="5" name="Rectangle 4"/>
@@ -11906,7 +11896,7 @@
                               <a:latin typeface="Cambria Math" panose="02040503050406030204" pitchFamily="18" charset="0"/>
                               <a:ea typeface="Cambria Math" panose="02040503050406030204" pitchFamily="18" charset="0"/>
                             </a:rPr>
-                            <m:t>𝑑</m:t>
+                            <m:t>𝜕</m:t>
                           </m:r>
                         </m:num>
                         <m:den>
@@ -11915,7 +11905,7 @@
                               <a:latin typeface="Cambria Math" panose="02040503050406030204" pitchFamily="18" charset="0"/>
                               <a:ea typeface="Cambria Math" panose="02040503050406030204" pitchFamily="18" charset="0"/>
                             </a:rPr>
-                            <m:t>𝑑</m:t>
+                            <m:t>𝜕</m:t>
                           </m:r>
                           <m:sSub>
                             <m:sSubPr>
@@ -12259,7 +12249,7 @@
                               <a:latin typeface="Cambria Math" panose="02040503050406030204" pitchFamily="18" charset="0"/>
                               <a:ea typeface="Cambria Math" panose="02040503050406030204" pitchFamily="18" charset="0"/>
                             </a:rPr>
-                            <m:t>𝑑</m:t>
+                            <m:t>𝜕</m:t>
                           </m:r>
                         </m:num>
                         <m:den>
@@ -12268,7 +12258,7 @@
                               <a:latin typeface="Cambria Math" panose="02040503050406030204" pitchFamily="18" charset="0"/>
                               <a:ea typeface="Cambria Math" panose="02040503050406030204" pitchFamily="18" charset="0"/>
                             </a:rPr>
-                            <m:t>𝑑</m:t>
+                            <m:t>𝜕</m:t>
                           </m:r>
                           <m:sSub>
                             <m:sSubPr>
@@ -12632,7 +12622,7 @@
             </p:txBody>
           </p:sp>
         </mc:Choice>
-        <mc:Fallback xmlns="">
+        <mc:Fallback>
           <p:sp>
             <p:nvSpPr>
               <p:cNvPr id="5" name="Rectangle 4"/>
@@ -15783,8 +15773,8 @@
           </p:sp>
         </mc:Fallback>
       </mc:AlternateContent>
-      <mc:AlternateContent xmlns:mc="http://schemas.openxmlformats.org/markup-compatibility/2006" xmlns:a14="http://schemas.microsoft.com/office/drawing/2010/main">
-        <mc:Choice Requires="a14">
+      <mc:AlternateContent xmlns:mc="http://schemas.openxmlformats.org/markup-compatibility/2006">
+        <mc:Choice xmlns:a14="http://schemas.microsoft.com/office/drawing/2010/main" Requires="a14">
           <p:sp>
             <p:nvSpPr>
               <p:cNvPr id="3" name="Rectangle 2"/>
@@ -16352,20 +16342,20 @@
                         </m:fPr>
                         <m:num>
                           <m:r>
-                            <a:rPr lang="en-US" sz="1200" b="0" i="1" smtClean="0">
+                            <a:rPr lang="en-US" sz="1200" i="1">
                               <a:latin typeface="Cambria Math" panose="02040503050406030204" pitchFamily="18" charset="0"/>
                               <a:ea typeface="Cambria Math" panose="02040503050406030204" pitchFamily="18" charset="0"/>
                             </a:rPr>
-                            <m:t>𝑑</m:t>
+                            <m:t>𝜕</m:t>
                           </m:r>
                         </m:num>
                         <m:den>
                           <m:r>
-                            <a:rPr lang="en-US" sz="1200" b="0" i="1" smtClean="0">
+                            <a:rPr lang="en-US" sz="1200" i="1">
                               <a:latin typeface="Cambria Math" panose="02040503050406030204" pitchFamily="18" charset="0"/>
                               <a:ea typeface="Cambria Math" panose="02040503050406030204" pitchFamily="18" charset="0"/>
                             </a:rPr>
-                            <m:t>𝑑</m:t>
+                            <m:t>𝜕</m:t>
                           </m:r>
                           <m:sSub>
                             <m:sSubPr>
@@ -16589,20 +16579,20 @@
                         </m:fPr>
                         <m:num>
                           <m:r>
-                            <a:rPr lang="en-US" sz="1200" b="0" i="1" smtClean="0">
+                            <a:rPr lang="en-US" sz="1200" i="1">
                               <a:latin typeface="Cambria Math" panose="02040503050406030204" pitchFamily="18" charset="0"/>
                               <a:ea typeface="Cambria Math" panose="02040503050406030204" pitchFamily="18" charset="0"/>
                             </a:rPr>
-                            <m:t>𝑑</m:t>
+                            <m:t>𝜕</m:t>
                           </m:r>
                         </m:num>
                         <m:den>
                           <m:r>
-                            <a:rPr lang="en-US" sz="1200" b="0" i="1" smtClean="0">
+                            <a:rPr lang="en-US" sz="1200" i="1">
                               <a:latin typeface="Cambria Math" panose="02040503050406030204" pitchFamily="18" charset="0"/>
                               <a:ea typeface="Cambria Math" panose="02040503050406030204" pitchFamily="18" charset="0"/>
                             </a:rPr>
-                            <m:t>𝑑</m:t>
+                            <m:t>𝜕</m:t>
                           </m:r>
                           <m:sSub>
                             <m:sSubPr>
@@ -16761,20 +16751,20 @@
                         </m:fPr>
                         <m:num>
                           <m:r>
-                            <a:rPr lang="en-US" sz="1200" b="0" i="1" smtClean="0">
+                            <a:rPr lang="en-US" sz="1200" i="1">
                               <a:latin typeface="Cambria Math" panose="02040503050406030204" pitchFamily="18" charset="0"/>
                               <a:ea typeface="Cambria Math" panose="02040503050406030204" pitchFamily="18" charset="0"/>
                             </a:rPr>
-                            <m:t>𝑑</m:t>
+                            <m:t>𝜕</m:t>
                           </m:r>
                         </m:num>
                         <m:den>
                           <m:r>
-                            <a:rPr lang="en-US" sz="1200" b="0" i="1" smtClean="0">
+                            <a:rPr lang="en-US" sz="1200" i="1">
                               <a:latin typeface="Cambria Math" panose="02040503050406030204" pitchFamily="18" charset="0"/>
                               <a:ea typeface="Cambria Math" panose="02040503050406030204" pitchFamily="18" charset="0"/>
                             </a:rPr>
-                            <m:t>𝑑</m:t>
+                            <m:t>𝜕</m:t>
                           </m:r>
                           <m:sSub>
                             <m:sSubPr>
@@ -16913,20 +16903,20 @@
                         </m:fPr>
                         <m:num>
                           <m:r>
-                            <a:rPr lang="en-US" sz="1200" b="0" i="1" smtClean="0">
+                            <a:rPr lang="en-US" sz="1200" i="1" smtClean="0">
                               <a:latin typeface="Cambria Math" panose="02040503050406030204" pitchFamily="18" charset="0"/>
                               <a:ea typeface="Cambria Math" panose="02040503050406030204" pitchFamily="18" charset="0"/>
                             </a:rPr>
-                            <m:t>𝑑</m:t>
+                            <m:t>𝜕</m:t>
                           </m:r>
                         </m:num>
                         <m:den>
                           <m:r>
-                            <a:rPr lang="en-US" sz="1200" b="0" i="1" smtClean="0">
+                            <a:rPr lang="en-US" sz="1200" i="1">
                               <a:latin typeface="Cambria Math" panose="02040503050406030204" pitchFamily="18" charset="0"/>
                               <a:ea typeface="Cambria Math" panose="02040503050406030204" pitchFamily="18" charset="0"/>
                             </a:rPr>
-                            <m:t>𝑑</m:t>
+                            <m:t>𝜕</m:t>
                           </m:r>
                           <m:sSub>
                             <m:sSubPr>
@@ -17025,20 +17015,20 @@
                         </m:fPr>
                         <m:num>
                           <m:r>
-                            <a:rPr lang="en-US" sz="1200" b="0" i="1" smtClean="0">
+                            <a:rPr lang="en-US" sz="1200" i="1">
                               <a:latin typeface="Cambria Math" panose="02040503050406030204" pitchFamily="18" charset="0"/>
                               <a:ea typeface="Cambria Math" panose="02040503050406030204" pitchFamily="18" charset="0"/>
                             </a:rPr>
-                            <m:t>𝑑</m:t>
+                            <m:t>𝜕</m:t>
                           </m:r>
                         </m:num>
                         <m:den>
                           <m:r>
-                            <a:rPr lang="en-US" sz="1200" b="0" i="1" smtClean="0">
+                            <a:rPr lang="en-US" sz="1200" i="1">
                               <a:latin typeface="Cambria Math" panose="02040503050406030204" pitchFamily="18" charset="0"/>
                               <a:ea typeface="Cambria Math" panose="02040503050406030204" pitchFamily="18" charset="0"/>
                             </a:rPr>
-                            <m:t>𝑑</m:t>
+                            <m:t>𝜕</m:t>
                           </m:r>
                           <m:sSub>
                             <m:sSubPr>
@@ -17188,20 +17178,20 @@
                         </m:fPr>
                         <m:num>
                           <m:r>
-                            <a:rPr lang="en-US" sz="1200" b="0" i="1" smtClean="0">
+                            <a:rPr lang="en-US" sz="1200" i="1">
                               <a:latin typeface="Cambria Math" panose="02040503050406030204" pitchFamily="18" charset="0"/>
                               <a:ea typeface="Cambria Math" panose="02040503050406030204" pitchFamily="18" charset="0"/>
                             </a:rPr>
-                            <m:t>𝑑</m:t>
+                            <m:t>𝜕</m:t>
                           </m:r>
                         </m:num>
                         <m:den>
                           <m:r>
-                            <a:rPr lang="en-US" sz="1200" b="0" i="1" smtClean="0">
+                            <a:rPr lang="en-US" sz="1200" i="1">
                               <a:latin typeface="Cambria Math" panose="02040503050406030204" pitchFamily="18" charset="0"/>
                               <a:ea typeface="Cambria Math" panose="02040503050406030204" pitchFamily="18" charset="0"/>
                             </a:rPr>
-                            <m:t>𝑑</m:t>
+                            <m:t>𝜕</m:t>
                           </m:r>
                           <m:sSub>
                             <m:sSubPr>
@@ -17340,20 +17330,20 @@
                         </m:fPr>
                         <m:num>
                           <m:r>
-                            <a:rPr lang="en-US" sz="1200" b="0" i="1" smtClean="0">
+                            <a:rPr lang="en-US" sz="1200" i="1">
                               <a:latin typeface="Cambria Math" panose="02040503050406030204" pitchFamily="18" charset="0"/>
                               <a:ea typeface="Cambria Math" panose="02040503050406030204" pitchFamily="18" charset="0"/>
                             </a:rPr>
-                            <m:t>𝑑</m:t>
+                            <m:t>𝜕</m:t>
                           </m:r>
                         </m:num>
                         <m:den>
                           <m:r>
-                            <a:rPr lang="en-US" sz="1200" b="0" i="1" smtClean="0">
+                            <a:rPr lang="en-US" sz="1200" i="1">
                               <a:latin typeface="Cambria Math" panose="02040503050406030204" pitchFamily="18" charset="0"/>
                               <a:ea typeface="Cambria Math" panose="02040503050406030204" pitchFamily="18" charset="0"/>
                             </a:rPr>
-                            <m:t>𝑑</m:t>
+                            <m:t>𝜕</m:t>
                           </m:r>
                           <m:sSub>
                             <m:sSubPr>
@@ -17452,20 +17442,20 @@
                         </m:fPr>
                         <m:num>
                           <m:r>
-                            <a:rPr lang="en-US" sz="1200" b="0" i="1" smtClean="0">
+                            <a:rPr lang="en-US" sz="1200" i="1">
                               <a:latin typeface="Cambria Math" panose="02040503050406030204" pitchFamily="18" charset="0"/>
                               <a:ea typeface="Cambria Math" panose="02040503050406030204" pitchFamily="18" charset="0"/>
                             </a:rPr>
-                            <m:t>𝑑</m:t>
+                            <m:t>𝜕</m:t>
                           </m:r>
                         </m:num>
                         <m:den>
                           <m:r>
-                            <a:rPr lang="en-US" sz="1200" b="0" i="1" smtClean="0">
+                            <a:rPr lang="en-US" sz="1200" i="1">
                               <a:latin typeface="Cambria Math" panose="02040503050406030204" pitchFamily="18" charset="0"/>
                               <a:ea typeface="Cambria Math" panose="02040503050406030204" pitchFamily="18" charset="0"/>
                             </a:rPr>
-                            <m:t>𝑑</m:t>
+                            <m:t>𝜕</m:t>
                           </m:r>
                           <m:sSub>
                             <m:sSubPr>
@@ -17602,7 +17592,7 @@
             </p:txBody>
           </p:sp>
         </mc:Choice>
-        <mc:Fallback xmlns="">
+        <mc:Fallback>
           <p:sp>
             <p:nvSpPr>
               <p:cNvPr id="3" name="Rectangle 2"/>

</xml_diff>